<commit_message>
simple edit in the transactions
</commit_message>
<xml_diff>
--- a/Block Diagram_edited.pptx
+++ b/Block Diagram_edited.pptx
@@ -270,7 +270,7 @@
           <a:p>
             <a:fld id="{C0F70495-36A0-443F-8916-32C5B1CCA509}" type="datetimeFigureOut">
               <a:rPr lang="en-US" smtClean="0"/>
-              <a:t>3/30/2020</a:t>
+              <a:t>3/31/2020</a:t>
             </a:fld>
             <a:endParaRPr lang="en-US"/>
           </a:p>
@@ -468,7 +468,7 @@
           <a:p>
             <a:fld id="{C0F70495-36A0-443F-8916-32C5B1CCA509}" type="datetimeFigureOut">
               <a:rPr lang="en-US" smtClean="0"/>
-              <a:t>3/30/2020</a:t>
+              <a:t>3/31/2020</a:t>
             </a:fld>
             <a:endParaRPr lang="en-US"/>
           </a:p>
@@ -676,7 +676,7 @@
           <a:p>
             <a:fld id="{C0F70495-36A0-443F-8916-32C5B1CCA509}" type="datetimeFigureOut">
               <a:rPr lang="en-US" smtClean="0"/>
-              <a:t>3/30/2020</a:t>
+              <a:t>3/31/2020</a:t>
             </a:fld>
             <a:endParaRPr lang="en-US"/>
           </a:p>
@@ -874,7 +874,7 @@
           <a:p>
             <a:fld id="{C0F70495-36A0-443F-8916-32C5B1CCA509}" type="datetimeFigureOut">
               <a:rPr lang="en-US" smtClean="0"/>
-              <a:t>3/30/2020</a:t>
+              <a:t>3/31/2020</a:t>
             </a:fld>
             <a:endParaRPr lang="en-US"/>
           </a:p>
@@ -1149,7 +1149,7 @@
           <a:p>
             <a:fld id="{C0F70495-36A0-443F-8916-32C5B1CCA509}" type="datetimeFigureOut">
               <a:rPr lang="en-US" smtClean="0"/>
-              <a:t>3/30/2020</a:t>
+              <a:t>3/31/2020</a:t>
             </a:fld>
             <a:endParaRPr lang="en-US"/>
           </a:p>
@@ -1414,7 +1414,7 @@
           <a:p>
             <a:fld id="{C0F70495-36A0-443F-8916-32C5B1CCA509}" type="datetimeFigureOut">
               <a:rPr lang="en-US" smtClean="0"/>
-              <a:t>3/30/2020</a:t>
+              <a:t>3/31/2020</a:t>
             </a:fld>
             <a:endParaRPr lang="en-US"/>
           </a:p>
@@ -1826,7 +1826,7 @@
           <a:p>
             <a:fld id="{C0F70495-36A0-443F-8916-32C5B1CCA509}" type="datetimeFigureOut">
               <a:rPr lang="en-US" smtClean="0"/>
-              <a:t>3/30/2020</a:t>
+              <a:t>3/31/2020</a:t>
             </a:fld>
             <a:endParaRPr lang="en-US"/>
           </a:p>
@@ -1967,7 +1967,7 @@
           <a:p>
             <a:fld id="{C0F70495-36A0-443F-8916-32C5B1CCA509}" type="datetimeFigureOut">
               <a:rPr lang="en-US" smtClean="0"/>
-              <a:t>3/30/2020</a:t>
+              <a:t>3/31/2020</a:t>
             </a:fld>
             <a:endParaRPr lang="en-US"/>
           </a:p>
@@ -2080,7 +2080,7 @@
           <a:p>
             <a:fld id="{C0F70495-36A0-443F-8916-32C5B1CCA509}" type="datetimeFigureOut">
               <a:rPr lang="en-US" smtClean="0"/>
-              <a:t>3/30/2020</a:t>
+              <a:t>3/31/2020</a:t>
             </a:fld>
             <a:endParaRPr lang="en-US"/>
           </a:p>
@@ -2391,7 +2391,7 @@
           <a:p>
             <a:fld id="{C0F70495-36A0-443F-8916-32C5B1CCA509}" type="datetimeFigureOut">
               <a:rPr lang="en-US" smtClean="0"/>
-              <a:t>3/30/2020</a:t>
+              <a:t>3/31/2020</a:t>
             </a:fld>
             <a:endParaRPr lang="en-US"/>
           </a:p>
@@ -2679,7 +2679,7 @@
           <a:p>
             <a:fld id="{C0F70495-36A0-443F-8916-32C5B1CCA509}" type="datetimeFigureOut">
               <a:rPr lang="en-US" smtClean="0"/>
-              <a:t>3/30/2020</a:t>
+              <a:t>3/31/2020</a:t>
             </a:fld>
             <a:endParaRPr lang="en-US"/>
           </a:p>
@@ -2920,7 +2920,7 @@
           <a:p>
             <a:fld id="{C0F70495-36A0-443F-8916-32C5B1CCA509}" type="datetimeFigureOut">
               <a:rPr lang="en-US" smtClean="0"/>
-              <a:t>3/30/2020</a:t>
+              <a:t>3/31/2020</a:t>
             </a:fld>
             <a:endParaRPr lang="en-US"/>
           </a:p>
@@ -5317,10 +5317,9 @@
           <a:p>
             <a:pPr algn="ctr"/>
             <a:r>
-              <a:rPr lang="en-US" dirty="0" err="1"/>
+              <a:rPr lang="en-US" dirty="0"/>
               <a:t>Leon_Dut</a:t>
             </a:r>
-            <a:endParaRPr lang="en-US" dirty="0"/>
           </a:p>
         </p:txBody>
       </p:sp>
@@ -5391,10 +5390,9 @@
           <a:p>
             <a:pPr algn="ctr"/>
             <a:r>
-              <a:rPr lang="en-US" dirty="0" err="1"/>
+              <a:rPr lang="en-US" dirty="0"/>
               <a:t>Amber_Dut</a:t>
             </a:r>
-            <a:endParaRPr lang="en-US" dirty="0"/>
           </a:p>
         </p:txBody>
       </p:sp>
@@ -5465,10 +5463,9 @@
           <a:p>
             <a:pPr algn="ctr"/>
             <a:r>
-              <a:rPr lang="en-US" dirty="0" err="1"/>
+              <a:rPr lang="en-US" dirty="0"/>
               <a:t>Riscy_Dut</a:t>
             </a:r>
-            <a:endParaRPr lang="en-US" dirty="0"/>
           </a:p>
         </p:txBody>
       </p:sp>
@@ -6105,10 +6102,10 @@
       </p:cxnSp>
       <p:sp>
         <p:nvSpPr>
-          <p:cNvPr id="2" name="Rectangle 1">
-            <a:extLst>
-              <a:ext uri="{FF2B5EF4-FFF2-40B4-BE49-F238E27FC236}">
-                <a16:creationId xmlns:a16="http://schemas.microsoft.com/office/drawing/2014/main" id="{3AA82073-77D6-4F67-8739-0D3EF11E8B1F}"/>
+          <p:cNvPr id="45" name="Rectangle 44">
+            <a:extLst>
+              <a:ext uri="{FF2B5EF4-FFF2-40B4-BE49-F238E27FC236}">
+                <a16:creationId xmlns:a16="http://schemas.microsoft.com/office/drawing/2014/main" id="{69BE614E-5706-4C35-A105-1315C9BA2A6C}"/>
               </a:ext>
             </a:extLst>
           </p:cNvPr>
@@ -6117,7 +6114,7 @@
         </p:nvSpPr>
         <p:spPr>
           <a:xfrm>
-            <a:off x="2625213" y="4025900"/>
+            <a:off x="6349784" y="3994278"/>
             <a:ext cx="378158" cy="213479"/>
           </a:xfrm>
           <a:prstGeom prst="rect">
@@ -6154,10 +6151,10 @@
       </p:sp>
       <p:sp>
         <p:nvSpPr>
-          <p:cNvPr id="3" name="TextBox 2">
-            <a:extLst>
-              <a:ext uri="{FF2B5EF4-FFF2-40B4-BE49-F238E27FC236}">
-                <a16:creationId xmlns:a16="http://schemas.microsoft.com/office/drawing/2014/main" id="{1809CC05-9DBB-435F-B02E-755E6A43F394}"/>
+          <p:cNvPr id="46" name="TextBox 45">
+            <a:extLst>
+              <a:ext uri="{FF2B5EF4-FFF2-40B4-BE49-F238E27FC236}">
+                <a16:creationId xmlns:a16="http://schemas.microsoft.com/office/drawing/2014/main" id="{6F11598B-D1B1-43D1-BFAD-725368648FFB}"/>
               </a:ext>
             </a:extLst>
           </p:cNvPr>
@@ -6166,8 +6163,8 @@
         </p:nvSpPr>
         <p:spPr>
           <a:xfrm>
-            <a:off x="1484872" y="3953621"/>
-            <a:ext cx="1286052" cy="338554"/>
+            <a:off x="4938760" y="3933200"/>
+            <a:ext cx="1425527" cy="307777"/>
           </a:xfrm>
           <a:prstGeom prst="rect">
             <a:avLst/>
@@ -6181,18 +6178,18 @@
           <a:lstStyle/>
           <a:p>
             <a:r>
-              <a:rPr lang="en-US" sz="1600" dirty="0"/>
-              <a:t>Transaction</a:t>
-            </a:r>
-          </a:p>
-        </p:txBody>
-      </p:sp>
-      <p:sp>
-        <p:nvSpPr>
-          <p:cNvPr id="45" name="Rectangle 44">
-            <a:extLst>
-              <a:ext uri="{FF2B5EF4-FFF2-40B4-BE49-F238E27FC236}">
-                <a16:creationId xmlns:a16="http://schemas.microsoft.com/office/drawing/2014/main" id="{69BE614E-5706-4C35-A105-1315C9BA2A6C}"/>
+              <a:rPr lang="en-US" sz="1400" dirty="0"/>
+              <a:t>Target_Seq_item</a:t>
+            </a:r>
+          </a:p>
+        </p:txBody>
+      </p:sp>
+      <p:sp>
+        <p:nvSpPr>
+          <p:cNvPr id="48" name="Rectangle 47">
+            <a:extLst>
+              <a:ext uri="{FF2B5EF4-FFF2-40B4-BE49-F238E27FC236}">
+                <a16:creationId xmlns:a16="http://schemas.microsoft.com/office/drawing/2014/main" id="{29735513-B8D5-41FD-B80E-DA7D475B9B97}"/>
               </a:ext>
             </a:extLst>
           </p:cNvPr>
@@ -6201,7 +6198,7 @@
         </p:nvSpPr>
         <p:spPr>
           <a:xfrm>
-            <a:off x="6349784" y="3994278"/>
+            <a:off x="7642025" y="1825390"/>
             <a:ext cx="378158" cy="213479"/>
           </a:xfrm>
           <a:prstGeom prst="rect">
@@ -6238,10 +6235,10 @@
       </p:sp>
       <p:sp>
         <p:nvSpPr>
-          <p:cNvPr id="46" name="TextBox 45">
-            <a:extLst>
-              <a:ext uri="{FF2B5EF4-FFF2-40B4-BE49-F238E27FC236}">
-                <a16:creationId xmlns:a16="http://schemas.microsoft.com/office/drawing/2014/main" id="{6F11598B-D1B1-43D1-BFAD-725368648FFB}"/>
+          <p:cNvPr id="50" name="TextBox 49">
+            <a:extLst>
+              <a:ext uri="{FF2B5EF4-FFF2-40B4-BE49-F238E27FC236}">
+                <a16:creationId xmlns:a16="http://schemas.microsoft.com/office/drawing/2014/main" id="{C4B34864-6CED-45E2-A37F-22AD59F6203F}"/>
               </a:ext>
             </a:extLst>
           </p:cNvPr>
@@ -6250,8 +6247,8 @@
         </p:nvSpPr>
         <p:spPr>
           <a:xfrm>
-            <a:off x="5043828" y="3933200"/>
-            <a:ext cx="1320459" cy="307777"/>
+            <a:off x="6231001" y="1764312"/>
+            <a:ext cx="1425527" cy="307777"/>
           </a:xfrm>
           <a:prstGeom prst="rect">
             <a:avLst/>
@@ -6265,10 +6262,212 @@
           <a:lstStyle/>
           <a:p>
             <a:r>
-              <a:rPr lang="en-US" sz="1400" dirty="0" err="1"/>
-              <a:t>Sequence_item</a:t>
-            </a:r>
-            <a:endParaRPr lang="en-US" sz="1400" dirty="0"/>
+              <a:rPr lang="en-US" sz="1400" dirty="0"/>
+              <a:t>Target_Seq_item</a:t>
+            </a:r>
+          </a:p>
+        </p:txBody>
+      </p:sp>
+      <p:sp>
+        <p:nvSpPr>
+          <p:cNvPr id="52" name="Rectangle 51">
+            <a:extLst>
+              <a:ext uri="{FF2B5EF4-FFF2-40B4-BE49-F238E27FC236}">
+                <a16:creationId xmlns:a16="http://schemas.microsoft.com/office/drawing/2014/main" id="{6AC2B0AA-25B4-43C8-8D28-F25067098F1E}"/>
+              </a:ext>
+            </a:extLst>
+          </p:cNvPr>
+          <p:cNvSpPr/>
+          <p:nvPr/>
+        </p:nvSpPr>
+        <p:spPr>
+          <a:xfrm>
+            <a:off x="8248033" y="2303820"/>
+            <a:ext cx="378158" cy="213479"/>
+          </a:xfrm>
+          <a:prstGeom prst="rect">
+            <a:avLst/>
+          </a:prstGeom>
+          <a:solidFill>
+            <a:srgbClr val="FF0000"/>
+          </a:solidFill>
+        </p:spPr>
+        <p:style>
+          <a:lnRef idx="2">
+            <a:schemeClr val="accent1">
+              <a:shade val="50000"/>
+            </a:schemeClr>
+          </a:lnRef>
+          <a:fillRef idx="1">
+            <a:schemeClr val="accent1"/>
+          </a:fillRef>
+          <a:effectRef idx="0">
+            <a:schemeClr val="accent1"/>
+          </a:effectRef>
+          <a:fontRef idx="minor">
+            <a:schemeClr val="lt1"/>
+          </a:fontRef>
+        </p:style>
+        <p:txBody>
+          <a:bodyPr rtlCol="0" anchor="ctr"/>
+          <a:lstStyle/>
+          <a:p>
+            <a:pPr algn="ctr"/>
+            <a:endParaRPr lang="en-US"/>
+          </a:p>
+        </p:txBody>
+      </p:sp>
+      <p:sp>
+        <p:nvSpPr>
+          <p:cNvPr id="55" name="TextBox 54">
+            <a:extLst>
+              <a:ext uri="{FF2B5EF4-FFF2-40B4-BE49-F238E27FC236}">
+                <a16:creationId xmlns:a16="http://schemas.microsoft.com/office/drawing/2014/main" id="{E13B0438-9C39-46D7-9507-7729E723BB5D}"/>
+              </a:ext>
+            </a:extLst>
+          </p:cNvPr>
+          <p:cNvSpPr txBox="1"/>
+          <p:nvPr/>
+        </p:nvSpPr>
+        <p:spPr>
+          <a:xfrm>
+            <a:off x="6837009" y="2242742"/>
+            <a:ext cx="1425527" cy="307777"/>
+          </a:xfrm>
+          <a:prstGeom prst="rect">
+            <a:avLst/>
+          </a:prstGeom>
+          <a:noFill/>
+        </p:spPr>
+        <p:txBody>
+          <a:bodyPr wrap="square" rtlCol="0">
+            <a:spAutoFit/>
+          </a:bodyPr>
+          <a:lstStyle/>
+          <a:p>
+            <a:r>
+              <a:rPr lang="en-US" sz="1400" dirty="0"/>
+              <a:t>Target_Seq_item</a:t>
+            </a:r>
+          </a:p>
+        </p:txBody>
+      </p:sp>
+      <p:sp>
+        <p:nvSpPr>
+          <p:cNvPr id="57" name="Rectangle 56">
+            <a:extLst>
+              <a:ext uri="{FF2B5EF4-FFF2-40B4-BE49-F238E27FC236}">
+                <a16:creationId xmlns:a16="http://schemas.microsoft.com/office/drawing/2014/main" id="{5B2338F9-FA56-4944-AA3C-A1855BCEB10B}"/>
+              </a:ext>
+            </a:extLst>
+          </p:cNvPr>
+          <p:cNvSpPr/>
+          <p:nvPr/>
+        </p:nvSpPr>
+        <p:spPr>
+          <a:xfrm>
+            <a:off x="2791963" y="1925931"/>
+            <a:ext cx="378158" cy="213479"/>
+          </a:xfrm>
+          <a:prstGeom prst="rect">
+            <a:avLst/>
+          </a:prstGeom>
+          <a:solidFill>
+            <a:srgbClr val="FF0000"/>
+          </a:solidFill>
+        </p:spPr>
+        <p:style>
+          <a:lnRef idx="2">
+            <a:schemeClr val="accent1">
+              <a:shade val="50000"/>
+            </a:schemeClr>
+          </a:lnRef>
+          <a:fillRef idx="1">
+            <a:schemeClr val="accent1"/>
+          </a:fillRef>
+          <a:effectRef idx="0">
+            <a:schemeClr val="accent1"/>
+          </a:effectRef>
+          <a:fontRef idx="minor">
+            <a:schemeClr val="lt1"/>
+          </a:fontRef>
+        </p:style>
+        <p:txBody>
+          <a:bodyPr rtlCol="0" anchor="ctr"/>
+          <a:lstStyle/>
+          <a:p>
+            <a:pPr algn="ctr"/>
+            <a:endParaRPr lang="en-US"/>
+          </a:p>
+        </p:txBody>
+      </p:sp>
+      <p:sp>
+        <p:nvSpPr>
+          <p:cNvPr id="61" name="TextBox 60">
+            <a:extLst>
+              <a:ext uri="{FF2B5EF4-FFF2-40B4-BE49-F238E27FC236}">
+                <a16:creationId xmlns:a16="http://schemas.microsoft.com/office/drawing/2014/main" id="{EB6EA40C-6868-4CCC-B490-8D4773156E4E}"/>
+              </a:ext>
+            </a:extLst>
+          </p:cNvPr>
+          <p:cNvSpPr txBox="1"/>
+          <p:nvPr/>
+        </p:nvSpPr>
+        <p:spPr>
+          <a:xfrm>
+            <a:off x="1276006" y="1869679"/>
+            <a:ext cx="1760129" cy="307777"/>
+          </a:xfrm>
+          <a:prstGeom prst="rect">
+            <a:avLst/>
+          </a:prstGeom>
+          <a:noFill/>
+        </p:spPr>
+        <p:txBody>
+          <a:bodyPr wrap="square" rtlCol="0">
+            <a:spAutoFit/>
+          </a:bodyPr>
+          <a:lstStyle/>
+          <a:p>
+            <a:r>
+              <a:rPr lang="en-US" sz="1400" dirty="0"/>
+              <a:t>Result_transaction</a:t>
+            </a:r>
+          </a:p>
+        </p:txBody>
+      </p:sp>
+      <p:sp>
+        <p:nvSpPr>
+          <p:cNvPr id="14" name="TextBox 13">
+            <a:extLst>
+              <a:ext uri="{FF2B5EF4-FFF2-40B4-BE49-F238E27FC236}">
+                <a16:creationId xmlns:a16="http://schemas.microsoft.com/office/drawing/2014/main" id="{186430CB-8303-4E98-82FC-AE4158AF80C4}"/>
+              </a:ext>
+            </a:extLst>
+          </p:cNvPr>
+          <p:cNvSpPr txBox="1"/>
+          <p:nvPr/>
+        </p:nvSpPr>
+        <p:spPr>
+          <a:xfrm>
+            <a:off x="2500175" y="4683490"/>
+            <a:ext cx="2320508" cy="307777"/>
+          </a:xfrm>
+          <a:prstGeom prst="rect">
+            <a:avLst/>
+          </a:prstGeom>
+          <a:noFill/>
+        </p:spPr>
+        <p:txBody>
+          <a:bodyPr wrap="square" rtlCol="0">
+            <a:spAutoFit/>
+          </a:bodyPr>
+          <a:lstStyle/>
+          <a:p>
+            <a:r>
+              <a:rPr lang="en-US" sz="1400" dirty="0"/>
+              <a:t>Write_to_monitor_function</a:t>
+            </a:r>
           </a:p>
         </p:txBody>
       </p:sp>

</xml_diff>